<commit_message>
Completed by adding conclusion
</commit_message>
<xml_diff>
--- a/Project Plan Presentation.pptx
+++ b/Project Plan Presentation.pptx
@@ -14,6 +14,11 @@
     <p:sldId id="264" r:id="rId8"/>
     <p:sldId id="265" r:id="rId9"/>
     <p:sldId id="257" r:id="rId10"/>
+    <p:sldId id="266" r:id="rId11"/>
+    <p:sldId id="267" r:id="rId12"/>
+    <p:sldId id="268" r:id="rId13"/>
+    <p:sldId id="269" r:id="rId14"/>
+    <p:sldId id="270" r:id="rId15"/>
   </p:sldIdLst>
   <p:sldSz cx="12192000" cy="6858000"/>
   <p:notesSz cx="6858000" cy="9144000"/>
@@ -113,27 +118,6 @@
     </a:lvl9pPr>
   </p:defaultTextStyle>
   <p:extLst>
-    <p:ext uri="{521415D9-36F7-43E2-AB2F-B90AF26B5E84}">
-      <p14:sectionLst xmlns:p14="http://schemas.microsoft.com/office/powerpoint/2010/main">
-        <p14:section name="Default Section" id="{C5E2E23A-8ED5-4898-82A3-0BB610AEDC54}">
-          <p14:sldIdLst>
-            <p14:sldId id="259"/>
-            <p14:sldId id="260"/>
-            <p14:sldId id="261"/>
-            <p14:sldId id="262"/>
-            <p14:sldId id="263"/>
-            <p14:sldId id="256"/>
-            <p14:sldId id="264"/>
-            <p14:sldId id="265"/>
-          </p14:sldIdLst>
-        </p14:section>
-        <p14:section name="Untitled Section" id="{19DE15CA-2F38-43CA-AA68-B7B5E54EFE51}">
-          <p14:sldIdLst>
-            <p14:sldId id="257"/>
-          </p14:sldIdLst>
-        </p14:section>
-      </p14:sectionLst>
-    </p:ext>
     <p:ext uri="{EFAFB233-063F-42B5-8137-9DF3F51BA10A}">
       <p15:sldGuideLst xmlns:p15="http://schemas.microsoft.com/office/powerpoint/2012/main"/>
     </p:ext>
@@ -863,7 +847,7 @@
           <a:p>
             <a:fld id="{FB0827B1-B491-455C-B78B-D4CE8179E8F5}" type="datetimeFigureOut">
               <a:rPr lang="en-US" smtClean="0"/>
-              <a:t>8/27/2024</a:t>
+              <a:t>8/28/2024</a:t>
             </a:fld>
             <a:endParaRPr lang="en-US"/>
           </a:p>
@@ -1114,7 +1098,7 @@
           <a:p>
             <a:fld id="{FB0827B1-B491-455C-B78B-D4CE8179E8F5}" type="datetimeFigureOut">
               <a:rPr lang="en-US" smtClean="0"/>
-              <a:t>8/27/2024</a:t>
+              <a:t>8/28/2024</a:t>
             </a:fld>
             <a:endParaRPr lang="en-US"/>
           </a:p>
@@ -1428,7 +1412,7 @@
           <a:p>
             <a:fld id="{FB0827B1-B491-455C-B78B-D4CE8179E8F5}" type="datetimeFigureOut">
               <a:rPr lang="en-US" smtClean="0"/>
-              <a:t>8/27/2024</a:t>
+              <a:t>8/28/2024</a:t>
             </a:fld>
             <a:endParaRPr lang="en-US"/>
           </a:p>
@@ -1769,7 +1753,7 @@
           <a:p>
             <a:fld id="{FB0827B1-B491-455C-B78B-D4CE8179E8F5}" type="datetimeFigureOut">
               <a:rPr lang="en-US" smtClean="0"/>
-              <a:t>8/27/2024</a:t>
+              <a:t>8/28/2024</a:t>
             </a:fld>
             <a:endParaRPr lang="en-US"/>
           </a:p>
@@ -2083,7 +2067,7 @@
           <a:p>
             <a:fld id="{FB0827B1-B491-455C-B78B-D4CE8179E8F5}" type="datetimeFigureOut">
               <a:rPr lang="en-US" smtClean="0"/>
-              <a:t>8/27/2024</a:t>
+              <a:t>8/28/2024</a:t>
             </a:fld>
             <a:endParaRPr lang="en-US"/>
           </a:p>
@@ -2476,7 +2460,7 @@
           <a:p>
             <a:fld id="{FB0827B1-B491-455C-B78B-D4CE8179E8F5}" type="datetimeFigureOut">
               <a:rPr lang="en-US" smtClean="0"/>
-              <a:t>8/27/2024</a:t>
+              <a:t>8/28/2024</a:t>
             </a:fld>
             <a:endParaRPr lang="en-US"/>
           </a:p>
@@ -2646,7 +2630,7 @@
           <a:p>
             <a:fld id="{FB0827B1-B491-455C-B78B-D4CE8179E8F5}" type="datetimeFigureOut">
               <a:rPr lang="en-US" smtClean="0"/>
-              <a:t>8/27/2024</a:t>
+              <a:t>8/28/2024</a:t>
             </a:fld>
             <a:endParaRPr lang="en-US"/>
           </a:p>
@@ -2826,7 +2810,7 @@
           <a:p>
             <a:fld id="{FB0827B1-B491-455C-B78B-D4CE8179E8F5}" type="datetimeFigureOut">
               <a:rPr lang="en-US" smtClean="0"/>
-              <a:t>8/27/2024</a:t>
+              <a:t>8/28/2024</a:t>
             </a:fld>
             <a:endParaRPr lang="en-US"/>
           </a:p>
@@ -3002,7 +2986,7 @@
           <a:p>
             <a:fld id="{FB0827B1-B491-455C-B78B-D4CE8179E8F5}" type="datetimeFigureOut">
               <a:rPr lang="en-US" smtClean="0"/>
-              <a:t>8/27/2024</a:t>
+              <a:t>8/28/2024</a:t>
             </a:fld>
             <a:endParaRPr lang="en-US"/>
           </a:p>
@@ -3249,7 +3233,7 @@
           <a:p>
             <a:fld id="{FB0827B1-B491-455C-B78B-D4CE8179E8F5}" type="datetimeFigureOut">
               <a:rPr lang="en-US" smtClean="0"/>
-              <a:t>8/27/2024</a:t>
+              <a:t>8/28/2024</a:t>
             </a:fld>
             <a:endParaRPr lang="en-US"/>
           </a:p>
@@ -3481,7 +3465,7 @@
           <a:p>
             <a:fld id="{FB0827B1-B491-455C-B78B-D4CE8179E8F5}" type="datetimeFigureOut">
               <a:rPr lang="en-US" smtClean="0"/>
-              <a:t>8/27/2024</a:t>
+              <a:t>8/28/2024</a:t>
             </a:fld>
             <a:endParaRPr lang="en-US"/>
           </a:p>
@@ -3855,7 +3839,7 @@
           <a:p>
             <a:fld id="{FB0827B1-B491-455C-B78B-D4CE8179E8F5}" type="datetimeFigureOut">
               <a:rPr lang="en-US" smtClean="0"/>
-              <a:t>8/27/2024</a:t>
+              <a:t>8/28/2024</a:t>
             </a:fld>
             <a:endParaRPr lang="en-US"/>
           </a:p>
@@ -3978,7 +3962,7 @@
           <a:p>
             <a:fld id="{FB0827B1-B491-455C-B78B-D4CE8179E8F5}" type="datetimeFigureOut">
               <a:rPr lang="en-US" smtClean="0"/>
-              <a:t>8/27/2024</a:t>
+              <a:t>8/28/2024</a:t>
             </a:fld>
             <a:endParaRPr lang="en-US"/>
           </a:p>
@@ -4073,7 +4057,7 @@
           <a:p>
             <a:fld id="{FB0827B1-B491-455C-B78B-D4CE8179E8F5}" type="datetimeFigureOut">
               <a:rPr lang="en-US" smtClean="0"/>
-              <a:t>8/27/2024</a:t>
+              <a:t>8/28/2024</a:t>
             </a:fld>
             <a:endParaRPr lang="en-US"/>
           </a:p>
@@ -4328,7 +4312,7 @@
           <a:p>
             <a:fld id="{FB0827B1-B491-455C-B78B-D4CE8179E8F5}" type="datetimeFigureOut">
               <a:rPr lang="en-US" smtClean="0"/>
-              <a:t>8/27/2024</a:t>
+              <a:t>8/28/2024</a:t>
             </a:fld>
             <a:endParaRPr lang="en-US"/>
           </a:p>
@@ -4591,7 +4575,7 @@
           <a:p>
             <a:fld id="{FB0827B1-B491-455C-B78B-D4CE8179E8F5}" type="datetimeFigureOut">
               <a:rPr lang="en-US" smtClean="0"/>
-              <a:t>8/27/2024</a:t>
+              <a:t>8/28/2024</a:t>
             </a:fld>
             <a:endParaRPr lang="en-US"/>
           </a:p>
@@ -5334,7 +5318,7 @@
           <a:p>
             <a:fld id="{FB0827B1-B491-455C-B78B-D4CE8179E8F5}" type="datetimeFigureOut">
               <a:rPr lang="en-US" smtClean="0"/>
-              <a:t>8/27/2024</a:t>
+              <a:t>8/28/2024</a:t>
             </a:fld>
             <a:endParaRPr lang="en-US"/>
           </a:p>
@@ -6283,6 +6267,701 @@
 </p:sld>
 </file>
 
+<file path=ppt/slides/slide10.xml><?xml version="1.0" encoding="utf-8"?>
+<p:sld xmlns:a="http://schemas.openxmlformats.org/drawingml/2006/main" xmlns:r="http://schemas.openxmlformats.org/officeDocument/2006/relationships" xmlns:p="http://schemas.openxmlformats.org/presentationml/2006/main">
+  <p:cSld>
+    <p:spTree>
+      <p:nvGrpSpPr>
+        <p:cNvPr id="1" name=""/>
+        <p:cNvGrpSpPr/>
+        <p:nvPr/>
+      </p:nvGrpSpPr>
+      <p:grpSpPr>
+        <a:xfrm>
+          <a:off x="0" y="0"/>
+          <a:ext cx="0" cy="0"/>
+          <a:chOff x="0" y="0"/>
+          <a:chExt cx="0" cy="0"/>
+        </a:xfrm>
+      </p:grpSpPr>
+      <p:sp>
+        <p:nvSpPr>
+          <p:cNvPr id="2" name="Title 1">
+            <a:extLst>
+              <a:ext uri="{FF2B5EF4-FFF2-40B4-BE49-F238E27FC236}">
+                <a16:creationId xmlns:a16="http://schemas.microsoft.com/office/drawing/2014/main" id="{218671BD-D1A9-9CC8-CF86-681221143000}"/>
+              </a:ext>
+            </a:extLst>
+          </p:cNvPr>
+          <p:cNvSpPr>
+            <a:spLocks noGrp="1"/>
+          </p:cNvSpPr>
+          <p:nvPr>
+            <p:ph type="title"/>
+          </p:nvPr>
+        </p:nvSpPr>
+        <p:spPr/>
+        <p:txBody>
+          <a:bodyPr/>
+          <a:lstStyle/>
+          <a:p>
+            <a:r>
+              <a:rPr lang="en-US" dirty="0"/>
+              <a:t>Key Actions in the Admin Panel</a:t>
+            </a:r>
+          </a:p>
+        </p:txBody>
+      </p:sp>
+      <p:sp>
+        <p:nvSpPr>
+          <p:cNvPr id="3" name="Content Placeholder 2">
+            <a:extLst>
+              <a:ext uri="{FF2B5EF4-FFF2-40B4-BE49-F238E27FC236}">
+                <a16:creationId xmlns:a16="http://schemas.microsoft.com/office/drawing/2014/main" id="{EE99FAEE-E30D-B224-28E1-5437967F5518}"/>
+              </a:ext>
+            </a:extLst>
+          </p:cNvPr>
+          <p:cNvSpPr>
+            <a:spLocks noGrp="1"/>
+          </p:cNvSpPr>
+          <p:nvPr>
+            <p:ph idx="1"/>
+          </p:nvPr>
+        </p:nvSpPr>
+        <p:spPr>
+          <a:xfrm>
+            <a:off x="677334" y="2000169"/>
+            <a:ext cx="8596668" cy="4432716"/>
+          </a:xfrm>
+        </p:spPr>
+        <p:txBody>
+          <a:bodyPr>
+            <a:normAutofit lnSpcReduction="10000"/>
+          </a:bodyPr>
+          <a:lstStyle/>
+          <a:p>
+            <a:r>
+              <a:rPr lang="en-US" sz="2200" dirty="0"/>
+              <a:t>Upload Notes</a:t>
+            </a:r>
+          </a:p>
+          <a:p>
+            <a:pPr lvl="1"/>
+            <a:r>
+              <a:rPr lang="en-US" sz="2000" dirty="0"/>
+              <a:t>Add study notes to the system, categorized by exam type.</a:t>
+            </a:r>
+          </a:p>
+          <a:p>
+            <a:r>
+              <a:rPr lang="en-US" sz="2200" dirty="0"/>
+              <a:t>Upload Question Bank</a:t>
+            </a:r>
+          </a:p>
+          <a:p>
+            <a:pPr lvl="1"/>
+            <a:r>
+              <a:rPr lang="en-US" sz="2000" dirty="0"/>
+              <a:t>Manage and upload questions for various exams.</a:t>
+            </a:r>
+          </a:p>
+          <a:p>
+            <a:r>
+              <a:rPr lang="en-US" sz="2200" dirty="0"/>
+              <a:t>Arrange Exam Series</a:t>
+            </a:r>
+          </a:p>
+          <a:p>
+            <a:pPr lvl="1"/>
+            <a:r>
+              <a:rPr lang="en-US" sz="2000" dirty="0"/>
+              <a:t>Organize and schedule category-wise exam series.</a:t>
+            </a:r>
+          </a:p>
+          <a:p>
+            <a:r>
+              <a:rPr lang="en-US" sz="2200" dirty="0"/>
+              <a:t>Set Questions for Live Exam</a:t>
+            </a:r>
+          </a:p>
+          <a:p>
+            <a:pPr lvl="1"/>
+            <a:r>
+              <a:rPr lang="en-US" sz="2000" dirty="0"/>
+              <a:t>Select and set questions for upcoming live exams.</a:t>
+            </a:r>
+          </a:p>
+          <a:p>
+            <a:r>
+              <a:rPr lang="en-US" sz="2200" dirty="0"/>
+              <a:t>Login</a:t>
+            </a:r>
+          </a:p>
+          <a:p>
+            <a:pPr lvl="1"/>
+            <a:r>
+              <a:rPr lang="en-US" sz="2000" dirty="0"/>
+              <a:t>Secure access to the admin panel for authorized users.</a:t>
+            </a:r>
+          </a:p>
+        </p:txBody>
+      </p:sp>
+    </p:spTree>
+    <p:extLst>
+      <p:ext uri="{BB962C8B-B14F-4D97-AF65-F5344CB8AC3E}">
+        <p14:creationId xmlns:p14="http://schemas.microsoft.com/office/powerpoint/2010/main" val="3919796197"/>
+      </p:ext>
+    </p:extLst>
+  </p:cSld>
+  <p:clrMapOvr>
+    <a:masterClrMapping/>
+  </p:clrMapOvr>
+</p:sld>
+</file>
+
+<file path=ppt/slides/slide11.xml><?xml version="1.0" encoding="utf-8"?>
+<p:sld xmlns:a="http://schemas.openxmlformats.org/drawingml/2006/main" xmlns:r="http://schemas.openxmlformats.org/officeDocument/2006/relationships" xmlns:p="http://schemas.openxmlformats.org/presentationml/2006/main">
+  <p:cSld>
+    <p:spTree>
+      <p:nvGrpSpPr>
+        <p:cNvPr id="1" name=""/>
+        <p:cNvGrpSpPr/>
+        <p:nvPr/>
+      </p:nvGrpSpPr>
+      <p:grpSpPr>
+        <a:xfrm>
+          <a:off x="0" y="0"/>
+          <a:ext cx="0" cy="0"/>
+          <a:chOff x="0" y="0"/>
+          <a:chExt cx="0" cy="0"/>
+        </a:xfrm>
+      </p:grpSpPr>
+      <p:sp>
+        <p:nvSpPr>
+          <p:cNvPr id="2" name="Title 1">
+            <a:extLst>
+              <a:ext uri="{FF2B5EF4-FFF2-40B4-BE49-F238E27FC236}">
+                <a16:creationId xmlns:a16="http://schemas.microsoft.com/office/drawing/2014/main" id="{C6133466-630E-DFEC-ACF7-24A1EC31F8E8}"/>
+              </a:ext>
+            </a:extLst>
+          </p:cNvPr>
+          <p:cNvSpPr>
+            <a:spLocks noGrp="1"/>
+          </p:cNvSpPr>
+          <p:nvPr>
+            <p:ph type="title"/>
+          </p:nvPr>
+        </p:nvSpPr>
+        <p:spPr/>
+        <p:txBody>
+          <a:bodyPr/>
+          <a:lstStyle/>
+          <a:p>
+            <a:r>
+              <a:rPr lang="en-US" dirty="0"/>
+              <a:t>Project Implementation</a:t>
+            </a:r>
+          </a:p>
+        </p:txBody>
+      </p:sp>
+      <p:sp>
+        <p:nvSpPr>
+          <p:cNvPr id="3" name="Content Placeholder 2">
+            <a:extLst>
+              <a:ext uri="{FF2B5EF4-FFF2-40B4-BE49-F238E27FC236}">
+                <a16:creationId xmlns:a16="http://schemas.microsoft.com/office/drawing/2014/main" id="{636C5591-6556-A5FE-EC27-AF6F530A03B5}"/>
+              </a:ext>
+            </a:extLst>
+          </p:cNvPr>
+          <p:cNvSpPr>
+            <a:spLocks noGrp="1"/>
+          </p:cNvSpPr>
+          <p:nvPr>
+            <p:ph idx="1"/>
+          </p:nvPr>
+        </p:nvSpPr>
+        <p:spPr/>
+        <p:txBody>
+          <a:bodyPr>
+            <a:normAutofit/>
+          </a:bodyPr>
+          <a:lstStyle/>
+          <a:p>
+            <a:r>
+              <a:rPr lang="en-US" sz="2200" dirty="0"/>
+              <a:t>Cross-Platform Development :</a:t>
+            </a:r>
+          </a:p>
+          <a:p>
+            <a:pPr lvl="1"/>
+            <a:r>
+              <a:rPr lang="en-US" sz="2000" dirty="0"/>
+              <a:t>The app is built for both Android and iOS, with admin and question setter panels designed for Windows.</a:t>
+            </a:r>
+          </a:p>
+          <a:p>
+            <a:r>
+              <a:rPr lang="en-US" sz="2200" dirty="0"/>
+              <a:t>Technology Stack :</a:t>
+            </a:r>
+          </a:p>
+          <a:p>
+            <a:pPr lvl="1"/>
+            <a:r>
+              <a:rPr lang="en-US" sz="2000" dirty="0"/>
+              <a:t>Front-End : Flutter (Dart Language) for developing a responsive and cross-platform user interface.</a:t>
+            </a:r>
+          </a:p>
+          <a:p>
+            <a:pPr lvl="1"/>
+            <a:r>
+              <a:rPr lang="en-US" sz="2000" dirty="0"/>
+              <a:t>Back-End Django to handle server-side logic and API management.</a:t>
+            </a:r>
+          </a:p>
+          <a:p>
+            <a:pPr lvl="1"/>
+            <a:r>
+              <a:rPr lang="en-US" sz="2000" dirty="0"/>
+              <a:t>Database: MySQL for managing and storing user data, exam questions, and results.</a:t>
+            </a:r>
+          </a:p>
+        </p:txBody>
+      </p:sp>
+    </p:spTree>
+    <p:extLst>
+      <p:ext uri="{BB962C8B-B14F-4D97-AF65-F5344CB8AC3E}">
+        <p14:creationId xmlns:p14="http://schemas.microsoft.com/office/powerpoint/2010/main" val="3061597587"/>
+      </p:ext>
+    </p:extLst>
+  </p:cSld>
+  <p:clrMapOvr>
+    <a:masterClrMapping/>
+  </p:clrMapOvr>
+</p:sld>
+</file>
+
+<file path=ppt/slides/slide12.xml><?xml version="1.0" encoding="utf-8"?>
+<p:sld xmlns:a="http://schemas.openxmlformats.org/drawingml/2006/main" xmlns:r="http://schemas.openxmlformats.org/officeDocument/2006/relationships" xmlns:p="http://schemas.openxmlformats.org/presentationml/2006/main">
+  <p:cSld>
+    <p:spTree>
+      <p:nvGrpSpPr>
+        <p:cNvPr id="1" name=""/>
+        <p:cNvGrpSpPr/>
+        <p:nvPr/>
+      </p:nvGrpSpPr>
+      <p:grpSpPr>
+        <a:xfrm>
+          <a:off x="0" y="0"/>
+          <a:ext cx="0" cy="0"/>
+          <a:chOff x="0" y="0"/>
+          <a:chExt cx="0" cy="0"/>
+        </a:xfrm>
+      </p:grpSpPr>
+      <p:sp>
+        <p:nvSpPr>
+          <p:cNvPr id="2" name="Title 1">
+            <a:extLst>
+              <a:ext uri="{FF2B5EF4-FFF2-40B4-BE49-F238E27FC236}">
+                <a16:creationId xmlns:a16="http://schemas.microsoft.com/office/drawing/2014/main" id="{59709F48-B3B4-EA31-A520-B538D69ECD1D}"/>
+              </a:ext>
+            </a:extLst>
+          </p:cNvPr>
+          <p:cNvSpPr>
+            <a:spLocks noGrp="1"/>
+          </p:cNvSpPr>
+          <p:nvPr>
+            <p:ph type="title"/>
+          </p:nvPr>
+        </p:nvSpPr>
+        <p:spPr/>
+        <p:txBody>
+          <a:bodyPr/>
+          <a:lstStyle/>
+          <a:p>
+            <a:r>
+              <a:rPr lang="en-US" dirty="0"/>
+              <a:t>Project Implementation</a:t>
+            </a:r>
+          </a:p>
+        </p:txBody>
+      </p:sp>
+      <p:sp>
+        <p:nvSpPr>
+          <p:cNvPr id="3" name="Content Placeholder 2">
+            <a:extLst>
+              <a:ext uri="{FF2B5EF4-FFF2-40B4-BE49-F238E27FC236}">
+                <a16:creationId xmlns:a16="http://schemas.microsoft.com/office/drawing/2014/main" id="{73877CE8-97D6-CCF6-0C94-F1075DCBA8FF}"/>
+              </a:ext>
+            </a:extLst>
+          </p:cNvPr>
+          <p:cNvSpPr>
+            <a:spLocks noGrp="1"/>
+          </p:cNvSpPr>
+          <p:nvPr>
+            <p:ph idx="1"/>
+          </p:nvPr>
+        </p:nvSpPr>
+        <p:spPr/>
+        <p:txBody>
+          <a:bodyPr>
+            <a:normAutofit/>
+          </a:bodyPr>
+          <a:lstStyle/>
+          <a:p>
+            <a:r>
+              <a:rPr lang="en-US" sz="2200" dirty="0"/>
+              <a:t>Architecture :</a:t>
+            </a:r>
+          </a:p>
+          <a:p>
+            <a:pPr lvl="1"/>
+            <a:r>
+              <a:rPr lang="en-US" sz="2000" dirty="0"/>
+              <a:t>Utilizes the MVVM (Model-View-</a:t>
+            </a:r>
+            <a:r>
+              <a:rPr lang="en-US" sz="2000" dirty="0" err="1"/>
+              <a:t>ViewModel</a:t>
+            </a:r>
+            <a:r>
+              <a:rPr lang="en-US" sz="2000" dirty="0"/>
+              <a:t>) architecture for scalable and maintainable codebase.</a:t>
+            </a:r>
+          </a:p>
+          <a:p>
+            <a:r>
+              <a:rPr lang="en-US" sz="2200" dirty="0"/>
+              <a:t>Deployment :</a:t>
+            </a:r>
+          </a:p>
+          <a:p>
+            <a:pPr lvl="1"/>
+            <a:r>
+              <a:rPr lang="en-US" sz="2000" dirty="0"/>
+              <a:t>Android and iOS apps will be deployed to their respective app stores.</a:t>
+            </a:r>
+          </a:p>
+          <a:p>
+            <a:pPr lvl="1"/>
+            <a:r>
+              <a:rPr lang="en-US" sz="2000" dirty="0"/>
+              <a:t>Admin and question setter panels will be deployed for windows OS.</a:t>
+            </a:r>
+          </a:p>
+        </p:txBody>
+      </p:sp>
+    </p:spTree>
+    <p:extLst>
+      <p:ext uri="{BB962C8B-B14F-4D97-AF65-F5344CB8AC3E}">
+        <p14:creationId xmlns:p14="http://schemas.microsoft.com/office/powerpoint/2010/main" val="3988173929"/>
+      </p:ext>
+    </p:extLst>
+  </p:cSld>
+  <p:clrMapOvr>
+    <a:masterClrMapping/>
+  </p:clrMapOvr>
+</p:sld>
+</file>
+
+<file path=ppt/slides/slide13.xml><?xml version="1.0" encoding="utf-8"?>
+<p:sld xmlns:a="http://schemas.openxmlformats.org/drawingml/2006/main" xmlns:r="http://schemas.openxmlformats.org/officeDocument/2006/relationships" xmlns:p="http://schemas.openxmlformats.org/presentationml/2006/main">
+  <p:cSld>
+    <p:spTree>
+      <p:nvGrpSpPr>
+        <p:cNvPr id="1" name=""/>
+        <p:cNvGrpSpPr/>
+        <p:nvPr/>
+      </p:nvGrpSpPr>
+      <p:grpSpPr>
+        <a:xfrm>
+          <a:off x="0" y="0"/>
+          <a:ext cx="0" cy="0"/>
+          <a:chOff x="0" y="0"/>
+          <a:chExt cx="0" cy="0"/>
+        </a:xfrm>
+      </p:grpSpPr>
+      <p:sp>
+        <p:nvSpPr>
+          <p:cNvPr id="2" name="Title 1">
+            <a:extLst>
+              <a:ext uri="{FF2B5EF4-FFF2-40B4-BE49-F238E27FC236}">
+                <a16:creationId xmlns:a16="http://schemas.microsoft.com/office/drawing/2014/main" id="{0CC9C0DD-B3FF-CAFA-85D2-98CB10A4C8F4}"/>
+              </a:ext>
+            </a:extLst>
+          </p:cNvPr>
+          <p:cNvSpPr>
+            <a:spLocks noGrp="1"/>
+          </p:cNvSpPr>
+          <p:nvPr>
+            <p:ph type="title"/>
+          </p:nvPr>
+        </p:nvSpPr>
+        <p:spPr>
+          <a:xfrm>
+            <a:off x="677334" y="96256"/>
+            <a:ext cx="8596668" cy="1320800"/>
+          </a:xfrm>
+        </p:spPr>
+        <p:txBody>
+          <a:bodyPr/>
+          <a:lstStyle/>
+          <a:p>
+            <a:r>
+              <a:rPr lang="en-US" dirty="0"/>
+              <a:t>Development Workflow</a:t>
+            </a:r>
+          </a:p>
+        </p:txBody>
+      </p:sp>
+      <p:sp>
+        <p:nvSpPr>
+          <p:cNvPr id="3" name="Content Placeholder 2">
+            <a:extLst>
+              <a:ext uri="{FF2B5EF4-FFF2-40B4-BE49-F238E27FC236}">
+                <a16:creationId xmlns:a16="http://schemas.microsoft.com/office/drawing/2014/main" id="{413AEC48-FE01-54C8-E804-C879A1B24A6C}"/>
+              </a:ext>
+            </a:extLst>
+          </p:cNvPr>
+          <p:cNvSpPr>
+            <a:spLocks noGrp="1"/>
+          </p:cNvSpPr>
+          <p:nvPr>
+            <p:ph idx="1"/>
+          </p:nvPr>
+        </p:nvSpPr>
+        <p:spPr>
+          <a:xfrm>
+            <a:off x="677334" y="962527"/>
+            <a:ext cx="8596668" cy="5895474"/>
+          </a:xfrm>
+        </p:spPr>
+        <p:txBody>
+          <a:bodyPr>
+            <a:normAutofit lnSpcReduction="10000"/>
+          </a:bodyPr>
+          <a:lstStyle/>
+          <a:p>
+            <a:r>
+              <a:rPr lang="en-US" sz="2200" dirty="0"/>
+              <a:t>Requirement Gathering &amp; Analysis</a:t>
+            </a:r>
+          </a:p>
+          <a:p>
+            <a:pPr lvl="1"/>
+            <a:r>
+              <a:rPr lang="en-US" sz="2000" dirty="0"/>
+              <a:t>Define features and technical requirements.</a:t>
+            </a:r>
+          </a:p>
+          <a:p>
+            <a:r>
+              <a:rPr lang="en-US" sz="2200" dirty="0"/>
+              <a:t>Design Phase</a:t>
+            </a:r>
+          </a:p>
+          <a:p>
+            <a:pPr lvl="1"/>
+            <a:r>
+              <a:rPr lang="en-US" sz="2000" dirty="0"/>
+              <a:t>UI/UX design, database schema, and architectural planning.</a:t>
+            </a:r>
+          </a:p>
+          <a:p>
+            <a:r>
+              <a:rPr lang="en-US" sz="2200" dirty="0"/>
+              <a:t>Front-End Development</a:t>
+            </a:r>
+          </a:p>
+          <a:p>
+            <a:pPr lvl="1"/>
+            <a:r>
+              <a:rPr lang="en-US" sz="2000" dirty="0"/>
+              <a:t>Build UI using Flutter, implement state management.</a:t>
+            </a:r>
+          </a:p>
+          <a:p>
+            <a:r>
+              <a:rPr lang="en-US" sz="2200" dirty="0"/>
+              <a:t>Back-End Development</a:t>
+            </a:r>
+          </a:p>
+          <a:p>
+            <a:pPr lvl="1"/>
+            <a:r>
+              <a:rPr lang="en-US" sz="2000" dirty="0"/>
+              <a:t>Develop APIs with Django; connect to MySQL database.</a:t>
+            </a:r>
+          </a:p>
+          <a:p>
+            <a:r>
+              <a:rPr lang="en-US" sz="2200" dirty="0"/>
+              <a:t>Testing &amp; Debugging</a:t>
+            </a:r>
+          </a:p>
+          <a:p>
+            <a:pPr lvl="1"/>
+            <a:r>
+              <a:rPr lang="en-US" sz="2000" dirty="0"/>
+              <a:t>Conduct unit, integration, and user acceptance testing.</a:t>
+            </a:r>
+          </a:p>
+          <a:p>
+            <a:r>
+              <a:rPr lang="en-US" sz="2200" dirty="0"/>
+              <a:t>Deployment</a:t>
+            </a:r>
+          </a:p>
+          <a:p>
+            <a:pPr lvl="1"/>
+            <a:r>
+              <a:rPr lang="en-US" sz="2000" dirty="0"/>
+              <a:t>Release on app stores; deploy admin panel on Windows.</a:t>
+            </a:r>
+          </a:p>
+          <a:p>
+            <a:r>
+              <a:rPr lang="en-US" sz="2200" dirty="0"/>
+              <a:t>Maintenance &amp; Updates</a:t>
+            </a:r>
+          </a:p>
+          <a:p>
+            <a:pPr lvl="1"/>
+            <a:r>
+              <a:rPr lang="en-US" sz="2000" dirty="0"/>
+              <a:t>Monitor, fix bugs, and update features regularly.</a:t>
+            </a:r>
+          </a:p>
+          <a:p>
+            <a:pPr lvl="1"/>
+            <a:endParaRPr lang="en-US" sz="2000" dirty="0"/>
+          </a:p>
+        </p:txBody>
+      </p:sp>
+    </p:spTree>
+    <p:extLst>
+      <p:ext uri="{BB962C8B-B14F-4D97-AF65-F5344CB8AC3E}">
+        <p14:creationId xmlns:p14="http://schemas.microsoft.com/office/powerpoint/2010/main" val="10021620"/>
+      </p:ext>
+    </p:extLst>
+  </p:cSld>
+  <p:clrMapOvr>
+    <a:masterClrMapping/>
+  </p:clrMapOvr>
+</p:sld>
+</file>
+
+<file path=ppt/slides/slide14.xml><?xml version="1.0" encoding="utf-8"?>
+<p:sld xmlns:a="http://schemas.openxmlformats.org/drawingml/2006/main" xmlns:r="http://schemas.openxmlformats.org/officeDocument/2006/relationships" xmlns:p="http://schemas.openxmlformats.org/presentationml/2006/main">
+  <p:cSld>
+    <p:spTree>
+      <p:nvGrpSpPr>
+        <p:cNvPr id="1" name=""/>
+        <p:cNvGrpSpPr/>
+        <p:nvPr/>
+      </p:nvGrpSpPr>
+      <p:grpSpPr>
+        <a:xfrm>
+          <a:off x="0" y="0"/>
+          <a:ext cx="0" cy="0"/>
+          <a:chOff x="0" y="0"/>
+          <a:chExt cx="0" cy="0"/>
+        </a:xfrm>
+      </p:grpSpPr>
+      <p:sp>
+        <p:nvSpPr>
+          <p:cNvPr id="2" name="Title 1">
+            <a:extLst>
+              <a:ext uri="{FF2B5EF4-FFF2-40B4-BE49-F238E27FC236}">
+                <a16:creationId xmlns:a16="http://schemas.microsoft.com/office/drawing/2014/main" id="{D0613C9B-C184-9FA9-7E16-5FC1B85FE404}"/>
+              </a:ext>
+            </a:extLst>
+          </p:cNvPr>
+          <p:cNvSpPr>
+            <a:spLocks noGrp="1"/>
+          </p:cNvSpPr>
+          <p:nvPr>
+            <p:ph type="title"/>
+          </p:nvPr>
+        </p:nvSpPr>
+        <p:spPr>
+          <a:xfrm>
+            <a:off x="677334" y="753978"/>
+            <a:ext cx="8596668" cy="1320800"/>
+          </a:xfrm>
+        </p:spPr>
+        <p:txBody>
+          <a:bodyPr/>
+          <a:lstStyle/>
+          <a:p>
+            <a:r>
+              <a:rPr lang="en-US" dirty="0"/>
+              <a:t>Conclusion</a:t>
+            </a:r>
+          </a:p>
+        </p:txBody>
+      </p:sp>
+      <p:sp>
+        <p:nvSpPr>
+          <p:cNvPr id="3" name="Content Placeholder 2">
+            <a:extLst>
+              <a:ext uri="{FF2B5EF4-FFF2-40B4-BE49-F238E27FC236}">
+                <a16:creationId xmlns:a16="http://schemas.microsoft.com/office/drawing/2014/main" id="{A6F27761-F57B-EF4E-891C-F8C398D4AC26}"/>
+              </a:ext>
+            </a:extLst>
+          </p:cNvPr>
+          <p:cNvSpPr>
+            <a:spLocks noGrp="1"/>
+          </p:cNvSpPr>
+          <p:nvPr>
+            <p:ph idx="1"/>
+          </p:nvPr>
+        </p:nvSpPr>
+        <p:spPr/>
+        <p:txBody>
+          <a:bodyPr>
+            <a:normAutofit/>
+          </a:bodyPr>
+          <a:lstStyle/>
+          <a:p>
+            <a:r>
+              <a:rPr lang="en-US" sz="2000" dirty="0"/>
+              <a:t>EduAssess360 addresses key challenges in exam preparation by providing a comprehensive, AI-driven solution.</a:t>
+            </a:r>
+          </a:p>
+          <a:p>
+            <a:r>
+              <a:rPr lang="en-US" sz="2000" dirty="0"/>
+              <a:t>The app enhances the learning experience with personalized feedback, targeted study materials, and structured exam practice.</a:t>
+            </a:r>
+          </a:p>
+          <a:p>
+            <a:r>
+              <a:rPr lang="en-US" sz="2000" dirty="0"/>
+              <a:t>Cross-platform implementation ensures accessibility for students on both Android and iOS, with robust support through admin and teacher panels.</a:t>
+            </a:r>
+          </a:p>
+          <a:p>
+            <a:r>
+              <a:rPr lang="en-US" sz="2000" dirty="0"/>
+              <a:t>Future updates will focus on expanding features and improving the user experience.</a:t>
+            </a:r>
+          </a:p>
+        </p:txBody>
+      </p:sp>
+    </p:spTree>
+    <p:extLst>
+      <p:ext uri="{BB962C8B-B14F-4D97-AF65-F5344CB8AC3E}">
+        <p14:creationId xmlns:p14="http://schemas.microsoft.com/office/powerpoint/2010/main" val="856855264"/>
+      </p:ext>
+    </p:extLst>
+  </p:cSld>
+  <p:clrMapOvr>
+    <a:masterClrMapping/>
+  </p:clrMapOvr>
+</p:sld>
+</file>
+
 <file path=ppt/slides/slide2.xml><?xml version="1.0" encoding="utf-8"?>
 <p:sld xmlns:a="http://schemas.openxmlformats.org/drawingml/2006/main" xmlns:r="http://schemas.openxmlformats.org/officeDocument/2006/relationships" xmlns:p="http://schemas.openxmlformats.org/presentationml/2006/main">
   <p:cSld>
@@ -7191,8 +7870,8 @@
         </p:blipFill>
         <p:spPr>
           <a:xfrm>
-            <a:off x="2796988" y="1412422"/>
-            <a:ext cx="5761584" cy="5445578"/>
+            <a:off x="2133600" y="785419"/>
+            <a:ext cx="6424972" cy="6072581"/>
           </a:xfrm>
           <a:prstGeom prst="rect">
             <a:avLst/>
@@ -7213,8 +7892,8 @@
         </p:nvSpPr>
         <p:spPr>
           <a:xfrm>
-            <a:off x="3621741" y="528918"/>
-            <a:ext cx="4634753" cy="369332"/>
+            <a:off x="3621741" y="224121"/>
+            <a:ext cx="4634753" cy="461665"/>
           </a:xfrm>
           <a:prstGeom prst="rect">
             <a:avLst/>
@@ -7228,7 +7907,14 @@
           <a:lstStyle/>
           <a:p>
             <a:r>
-              <a:rPr lang="en-US" dirty="0"/>
+              <a:rPr lang="en-US" sz="2400" b="1" dirty="0">
+                <a:solidFill>
+                  <a:schemeClr val="accent2">
+                    <a:lumMod val="60000"/>
+                    <a:lumOff val="40000"/>
+                  </a:schemeClr>
+                </a:solidFill>
+              </a:rPr>
               <a:t>Setter Panel Use Case Diagram</a:t>
             </a:r>
           </a:p>

</xml_diff>